<commit_message>
KOBA-08: dataClass, nestedClass, InnerClass, EnumClass
</commit_message>
<xml_diff>
--- a/kotlin-basic-2022/kotlin-basic.pptx
+++ b/kotlin-basic-2022/kotlin-basic.pptx
@@ -5,7 +5,7 @@
     <p:sldMasterId id="2147483648" r:id="rId1"/>
   </p:sldMasterIdLst>
   <p:notesMasterIdLst>
-    <p:notesMasterId r:id="rId12"/>
+    <p:notesMasterId r:id="rId16"/>
   </p:notesMasterIdLst>
   <p:sldIdLst>
     <p:sldId id="256" r:id="rId2"/>
@@ -18,6 +18,10 @@
     <p:sldId id="263" r:id="rId9"/>
     <p:sldId id="264" r:id="rId10"/>
     <p:sldId id="265" r:id="rId11"/>
+    <p:sldId id="266" r:id="rId12"/>
+    <p:sldId id="267" r:id="rId13"/>
+    <p:sldId id="268" r:id="rId14"/>
+    <p:sldId id="269" r:id="rId15"/>
   </p:sldIdLst>
   <p:sldSz cx="12192000" cy="6858000"/>
   <p:notesSz cx="6858000" cy="9144000"/>
@@ -206,7 +210,7 @@
           <a:p>
             <a:fld id="{632ED697-F779-4B55-8699-6008BDEBE6E8}" type="datetimeFigureOut">
               <a:rPr lang="en-US" smtClean="0"/>
-              <a:t>3/19/2022</a:t>
+              <a:t>3/20/2022</a:t>
             </a:fld>
             <a:endParaRPr lang="en-US"/>
           </a:p>
@@ -707,7 +711,7 @@
           <a:p>
             <a:fld id="{C169E7F0-550E-4DD8-9A82-5D5ABB171DFA}" type="datetimeFigureOut">
               <a:rPr lang="en-US" smtClean="0"/>
-              <a:t>3/19/2022</a:t>
+              <a:t>3/20/2022</a:t>
             </a:fld>
             <a:endParaRPr lang="en-US"/>
           </a:p>
@@ -907,7 +911,7 @@
           <a:p>
             <a:fld id="{C169E7F0-550E-4DD8-9A82-5D5ABB171DFA}" type="datetimeFigureOut">
               <a:rPr lang="en-US" smtClean="0"/>
-              <a:t>3/19/2022</a:t>
+              <a:t>3/20/2022</a:t>
             </a:fld>
             <a:endParaRPr lang="en-US"/>
           </a:p>
@@ -1117,7 +1121,7 @@
           <a:p>
             <a:fld id="{C169E7F0-550E-4DD8-9A82-5D5ABB171DFA}" type="datetimeFigureOut">
               <a:rPr lang="en-US" smtClean="0"/>
-              <a:t>3/19/2022</a:t>
+              <a:t>3/20/2022</a:t>
             </a:fld>
             <a:endParaRPr lang="en-US"/>
           </a:p>
@@ -1317,7 +1321,7 @@
           <a:p>
             <a:fld id="{C169E7F0-550E-4DD8-9A82-5D5ABB171DFA}" type="datetimeFigureOut">
               <a:rPr lang="en-US" smtClean="0"/>
-              <a:t>3/19/2022</a:t>
+              <a:t>3/20/2022</a:t>
             </a:fld>
             <a:endParaRPr lang="en-US"/>
           </a:p>
@@ -1593,7 +1597,7 @@
           <a:p>
             <a:fld id="{C169E7F0-550E-4DD8-9A82-5D5ABB171DFA}" type="datetimeFigureOut">
               <a:rPr lang="en-US" smtClean="0"/>
-              <a:t>3/19/2022</a:t>
+              <a:t>3/20/2022</a:t>
             </a:fld>
             <a:endParaRPr lang="en-US"/>
           </a:p>
@@ -1861,7 +1865,7 @@
           <a:p>
             <a:fld id="{C169E7F0-550E-4DD8-9A82-5D5ABB171DFA}" type="datetimeFigureOut">
               <a:rPr lang="en-US" smtClean="0"/>
-              <a:t>3/19/2022</a:t>
+              <a:t>3/20/2022</a:t>
             </a:fld>
             <a:endParaRPr lang="en-US"/>
           </a:p>
@@ -2276,7 +2280,7 @@
           <a:p>
             <a:fld id="{C169E7F0-550E-4DD8-9A82-5D5ABB171DFA}" type="datetimeFigureOut">
               <a:rPr lang="en-US" smtClean="0"/>
-              <a:t>3/19/2022</a:t>
+              <a:t>3/20/2022</a:t>
             </a:fld>
             <a:endParaRPr lang="en-US"/>
           </a:p>
@@ -2418,7 +2422,7 @@
           <a:p>
             <a:fld id="{C169E7F0-550E-4DD8-9A82-5D5ABB171DFA}" type="datetimeFigureOut">
               <a:rPr lang="en-US" smtClean="0"/>
-              <a:t>3/19/2022</a:t>
+              <a:t>3/20/2022</a:t>
             </a:fld>
             <a:endParaRPr lang="en-US"/>
           </a:p>
@@ -2531,7 +2535,7 @@
           <a:p>
             <a:fld id="{C169E7F0-550E-4DD8-9A82-5D5ABB171DFA}" type="datetimeFigureOut">
               <a:rPr lang="en-US" smtClean="0"/>
-              <a:t>3/19/2022</a:t>
+              <a:t>3/20/2022</a:t>
             </a:fld>
             <a:endParaRPr lang="en-US"/>
           </a:p>
@@ -2844,7 +2848,7 @@
           <a:p>
             <a:fld id="{C169E7F0-550E-4DD8-9A82-5D5ABB171DFA}" type="datetimeFigureOut">
               <a:rPr lang="en-US" smtClean="0"/>
-              <a:t>3/19/2022</a:t>
+              <a:t>3/20/2022</a:t>
             </a:fld>
             <a:endParaRPr lang="en-US"/>
           </a:p>
@@ -3133,7 +3137,7 @@
           <a:p>
             <a:fld id="{C169E7F0-550E-4DD8-9A82-5D5ABB171DFA}" type="datetimeFigureOut">
               <a:rPr lang="en-US" smtClean="0"/>
-              <a:t>3/19/2022</a:t>
+              <a:t>3/20/2022</a:t>
             </a:fld>
             <a:endParaRPr lang="en-US"/>
           </a:p>
@@ -3376,7 +3380,7 @@
           <a:p>
             <a:fld id="{C169E7F0-550E-4DD8-9A82-5D5ABB171DFA}" type="datetimeFigureOut">
               <a:rPr lang="en-US" smtClean="0"/>
-              <a:t>3/19/2022</a:t>
+              <a:t>3/20/2022</a:t>
             </a:fld>
             <a:endParaRPr lang="en-US"/>
           </a:p>
@@ -4330,6 +4334,806 @@
     <p:extLst>
       <p:ext uri="{BB962C8B-B14F-4D97-AF65-F5344CB8AC3E}">
         <p14:creationId xmlns:p14="http://schemas.microsoft.com/office/powerpoint/2010/main" val="2268766441"/>
+      </p:ext>
+    </p:extLst>
+  </p:cSld>
+  <p:clrMapOvr>
+    <a:masterClrMapping/>
+  </p:clrMapOvr>
+</p:sld>
+</file>
+
+<file path=ppt/slides/slide11.xml><?xml version="1.0" encoding="utf-8"?>
+<p:sld xmlns:a="http://schemas.openxmlformats.org/drawingml/2006/main" xmlns:r="http://schemas.openxmlformats.org/officeDocument/2006/relationships" xmlns:p="http://schemas.openxmlformats.org/presentationml/2006/main">
+  <p:cSld>
+    <p:bg>
+      <p:bgPr>
+        <a:solidFill>
+          <a:schemeClr val="bg1"/>
+        </a:solidFill>
+        <a:effectLst/>
+      </p:bgPr>
+    </p:bg>
+    <p:spTree>
+      <p:nvGrpSpPr>
+        <p:cNvPr id="1" name=""/>
+        <p:cNvGrpSpPr/>
+        <p:nvPr/>
+      </p:nvGrpSpPr>
+      <p:grpSpPr>
+        <a:xfrm>
+          <a:off x="0" y="0"/>
+          <a:ext cx="0" cy="0"/>
+          <a:chOff x="0" y="0"/>
+          <a:chExt cx="0" cy="0"/>
+        </a:xfrm>
+      </p:grpSpPr>
+      <p:sp useBgFill="1">
+        <p:nvSpPr>
+          <p:cNvPr id="25" name="Rectangle 16">
+            <a:extLst>
+              <a:ext uri="{FF2B5EF4-FFF2-40B4-BE49-F238E27FC236}">
+                <a16:creationId xmlns:a16="http://schemas.microsoft.com/office/drawing/2014/main" id="{907EF6B7-1338-4443-8C46-6A318D952DFD}"/>
+              </a:ext>
+              <a:ext uri="{C183D7F6-B498-43B3-948B-1728B52AA6E4}">
+                <adec:decorative xmlns:adec="http://schemas.microsoft.com/office/drawing/2017/decorative" val="1"/>
+              </a:ext>
+            </a:extLst>
+          </p:cNvPr>
+          <p:cNvSpPr>
+            <a:spLocks noGrp="1" noRot="1" noChangeAspect="1" noMove="1" noResize="1" noEditPoints="1" noAdjustHandles="1" noChangeArrowheads="1" noChangeShapeType="1" noTextEdit="1"/>
+          </p:cNvSpPr>
+          <p:nvPr>
+            <p:extLst>
+              <p:ext uri="{386F3935-93C4-4BCD-93E2-E3B085C9AB24}">
+                <p16:designElem xmlns:p16="http://schemas.microsoft.com/office/powerpoint/2015/main" val="1"/>
+              </p:ext>
+            </p:extLst>
+          </p:nvPr>
+        </p:nvSpPr>
+        <p:spPr>
+          <a:xfrm>
+            <a:off x="3048" y="0"/>
+            <a:ext cx="12188952" cy="6858000"/>
+          </a:xfrm>
+          <a:prstGeom prst="rect">
+            <a:avLst/>
+          </a:prstGeom>
+          <a:ln>
+            <a:noFill/>
+          </a:ln>
+        </p:spPr>
+        <p:style>
+          <a:lnRef idx="2">
+            <a:schemeClr val="accent1">
+              <a:shade val="50000"/>
+            </a:schemeClr>
+          </a:lnRef>
+          <a:fillRef idx="1">
+            <a:schemeClr val="accent1"/>
+          </a:fillRef>
+          <a:effectRef idx="0">
+            <a:schemeClr val="accent1"/>
+          </a:effectRef>
+          <a:fontRef idx="minor">
+            <a:schemeClr val="lt1"/>
+          </a:fontRef>
+        </p:style>
+        <p:txBody>
+          <a:bodyPr rtlCol="0" anchor="ctr"/>
+          <a:lstStyle/>
+          <a:p>
+            <a:pPr algn="ctr"/>
+            <a:endParaRPr lang="en-US"/>
+          </a:p>
+        </p:txBody>
+      </p:sp>
+      <p:sp>
+        <p:nvSpPr>
+          <p:cNvPr id="26" name="Freeform: Shape 18">
+            <a:extLst>
+              <a:ext uri="{FF2B5EF4-FFF2-40B4-BE49-F238E27FC236}">
+                <a16:creationId xmlns:a16="http://schemas.microsoft.com/office/drawing/2014/main" id="{DAAE4CDD-124C-4DCF-9584-B6033B545DD5}"/>
+              </a:ext>
+              <a:ext uri="{C183D7F6-B498-43B3-948B-1728B52AA6E4}">
+                <adec:decorative xmlns:adec="http://schemas.microsoft.com/office/drawing/2017/decorative" val="1"/>
+              </a:ext>
+            </a:extLst>
+          </p:cNvPr>
+          <p:cNvSpPr>
+            <a:spLocks noGrp="1" noRot="1" noChangeAspect="1" noMove="1" noResize="1" noEditPoints="1" noAdjustHandles="1" noChangeArrowheads="1" noChangeShapeType="1" noTextEdit="1"/>
+          </p:cNvSpPr>
+          <p:nvPr>
+            <p:extLst>
+              <p:ext uri="{386F3935-93C4-4BCD-93E2-E3B085C9AB24}">
+                <p16:designElem xmlns:p16="http://schemas.microsoft.com/office/powerpoint/2015/main" val="1"/>
+              </p:ext>
+            </p:extLst>
+          </p:nvPr>
+        </p:nvSpPr>
+        <p:spPr>
+          <a:xfrm>
+            <a:off x="1" y="0"/>
+            <a:ext cx="4167271" cy="6858000"/>
+          </a:xfrm>
+          <a:custGeom>
+            <a:avLst/>
+            <a:gdLst>
+              <a:gd name="connsiteX0" fmla="*/ 0 w 4167271"/>
+              <a:gd name="connsiteY0" fmla="*/ 0 h 6858000"/>
+              <a:gd name="connsiteX1" fmla="*/ 2259550 w 4167271"/>
+              <a:gd name="connsiteY1" fmla="*/ 0 h 6858000"/>
+              <a:gd name="connsiteX2" fmla="*/ 2387803 w 4167271"/>
+              <a:gd name="connsiteY2" fmla="*/ 82222 h 6858000"/>
+              <a:gd name="connsiteX3" fmla="*/ 4167271 w 4167271"/>
+              <a:gd name="connsiteY3" fmla="*/ 3429000 h 6858000"/>
+              <a:gd name="connsiteX4" fmla="*/ 2387803 w 4167271"/>
+              <a:gd name="connsiteY4" fmla="*/ 6775779 h 6858000"/>
+              <a:gd name="connsiteX5" fmla="*/ 2259550 w 4167271"/>
+              <a:gd name="connsiteY5" fmla="*/ 6858000 h 6858000"/>
+              <a:gd name="connsiteX6" fmla="*/ 0 w 4167271"/>
+              <a:gd name="connsiteY6" fmla="*/ 6858000 h 6858000"/>
+            </a:gdLst>
+            <a:ahLst/>
+            <a:cxnLst>
+              <a:cxn ang="0">
+                <a:pos x="connsiteX0" y="connsiteY0"/>
+              </a:cxn>
+              <a:cxn ang="0">
+                <a:pos x="connsiteX1" y="connsiteY1"/>
+              </a:cxn>
+              <a:cxn ang="0">
+                <a:pos x="connsiteX2" y="connsiteY2"/>
+              </a:cxn>
+              <a:cxn ang="0">
+                <a:pos x="connsiteX3" y="connsiteY3"/>
+              </a:cxn>
+              <a:cxn ang="0">
+                <a:pos x="connsiteX4" y="connsiteY4"/>
+              </a:cxn>
+              <a:cxn ang="0">
+                <a:pos x="connsiteX5" y="connsiteY5"/>
+              </a:cxn>
+              <a:cxn ang="0">
+                <a:pos x="connsiteX6" y="connsiteY6"/>
+              </a:cxn>
+            </a:cxnLst>
+            <a:rect l="l" t="t" r="r" b="b"/>
+            <a:pathLst>
+              <a:path w="4167271" h="6858000">
+                <a:moveTo>
+                  <a:pt x="0" y="0"/>
+                </a:moveTo>
+                <a:lnTo>
+                  <a:pt x="2259550" y="0"/>
+                </a:lnTo>
+                <a:lnTo>
+                  <a:pt x="2387803" y="82222"/>
+                </a:lnTo>
+                <a:cubicBezTo>
+                  <a:pt x="3461407" y="807534"/>
+                  <a:pt x="4167271" y="2035835"/>
+                  <a:pt x="4167271" y="3429000"/>
+                </a:cubicBezTo>
+                <a:cubicBezTo>
+                  <a:pt x="4167271" y="4822165"/>
+                  <a:pt x="3461407" y="6050467"/>
+                  <a:pt x="2387803" y="6775779"/>
+                </a:cubicBezTo>
+                <a:lnTo>
+                  <a:pt x="2259550" y="6858000"/>
+                </a:lnTo>
+                <a:lnTo>
+                  <a:pt x="0" y="6858000"/>
+                </a:lnTo>
+                <a:close/>
+              </a:path>
+            </a:pathLst>
+          </a:custGeom>
+          <a:solidFill>
+            <a:schemeClr val="accent2"/>
+          </a:solidFill>
+          <a:ln>
+            <a:noFill/>
+          </a:ln>
+        </p:spPr>
+        <p:style>
+          <a:lnRef idx="2">
+            <a:schemeClr val="accent1">
+              <a:shade val="50000"/>
+            </a:schemeClr>
+          </a:lnRef>
+          <a:fillRef idx="1">
+            <a:schemeClr val="accent1"/>
+          </a:fillRef>
+          <a:effectRef idx="0">
+            <a:schemeClr val="accent1"/>
+          </a:effectRef>
+          <a:fontRef idx="minor">
+            <a:schemeClr val="lt1"/>
+          </a:fontRef>
+        </p:style>
+        <p:txBody>
+          <a:bodyPr rtlCol="0" anchor="ctr"/>
+          <a:lstStyle/>
+          <a:p>
+            <a:pPr algn="ctr"/>
+            <a:endParaRPr lang="en-US"/>
+          </a:p>
+        </p:txBody>
+      </p:sp>
+      <p:sp>
+        <p:nvSpPr>
+          <p:cNvPr id="2" name="Tiêu đề 1">
+            <a:extLst>
+              <a:ext uri="{FF2B5EF4-FFF2-40B4-BE49-F238E27FC236}">
+                <a16:creationId xmlns:a16="http://schemas.microsoft.com/office/drawing/2014/main" id="{8729F755-CBB9-4155-85DD-963D1E69D6C5}"/>
+              </a:ext>
+            </a:extLst>
+          </p:cNvPr>
+          <p:cNvSpPr>
+            <a:spLocks noGrp="1"/>
+          </p:cNvSpPr>
+          <p:nvPr>
+            <p:ph type="title"/>
+          </p:nvPr>
+        </p:nvSpPr>
+        <p:spPr>
+          <a:xfrm>
+            <a:off x="686834" y="1153572"/>
+            <a:ext cx="3200400" cy="4461163"/>
+          </a:xfrm>
+        </p:spPr>
+        <p:txBody>
+          <a:bodyPr>
+            <a:normAutofit/>
+          </a:bodyPr>
+          <a:lstStyle/>
+          <a:p>
+            <a:r>
+              <a:rPr lang="en-US">
+                <a:solidFill>
+                  <a:srgbClr val="FFFFFF"/>
+                </a:solidFill>
+                <a:latin typeface="Times New Roman" panose="02020603050405020304" pitchFamily="18" charset="0"/>
+                <a:cs typeface="Times New Roman" panose="02020603050405020304" pitchFamily="18" charset="0"/>
+              </a:rPr>
+              <a:t>Lesson 4: Class &amp; OOP </a:t>
+            </a:r>
+          </a:p>
+        </p:txBody>
+      </p:sp>
+      <p:sp>
+        <p:nvSpPr>
+          <p:cNvPr id="27" name="Arc 20">
+            <a:extLst>
+              <a:ext uri="{FF2B5EF4-FFF2-40B4-BE49-F238E27FC236}">
+                <a16:creationId xmlns:a16="http://schemas.microsoft.com/office/drawing/2014/main" id="{081E4A58-353D-44AE-B2FC-2A74E2E400F7}"/>
+              </a:ext>
+              <a:ext uri="{C183D7F6-B498-43B3-948B-1728B52AA6E4}">
+                <adec:decorative xmlns:adec="http://schemas.microsoft.com/office/drawing/2017/decorative" val="1"/>
+              </a:ext>
+            </a:extLst>
+          </p:cNvPr>
+          <p:cNvSpPr>
+            <a:spLocks noGrp="1" noRot="1" noChangeAspect="1" noMove="1" noResize="1" noEditPoints="1" noAdjustHandles="1" noChangeArrowheads="1" noChangeShapeType="1" noTextEdit="1"/>
+          </p:cNvSpPr>
+          <p:nvPr>
+            <p:extLst>
+              <p:ext uri="{386F3935-93C4-4BCD-93E2-E3B085C9AB24}">
+                <p16:designElem xmlns:p16="http://schemas.microsoft.com/office/powerpoint/2015/main" val="1"/>
+              </p:ext>
+            </p:extLst>
+          </p:nvPr>
+        </p:nvSpPr>
+        <p:spPr>
+          <a:xfrm flipV="1">
+            <a:off x="7550402" y="2455479"/>
+            <a:ext cx="4083433" cy="4083433"/>
+          </a:xfrm>
+          <a:prstGeom prst="arc">
+            <a:avLst/>
+          </a:prstGeom>
+          <a:ln w="127000" cap="rnd">
+            <a:solidFill>
+              <a:schemeClr val="accent4"/>
+            </a:solidFill>
+            <a:prstDash val="dash"/>
+          </a:ln>
+        </p:spPr>
+        <p:style>
+          <a:lnRef idx="1">
+            <a:schemeClr val="accent1"/>
+          </a:lnRef>
+          <a:fillRef idx="0">
+            <a:schemeClr val="accent1"/>
+          </a:fillRef>
+          <a:effectRef idx="0">
+            <a:schemeClr val="accent1"/>
+          </a:effectRef>
+          <a:fontRef idx="minor">
+            <a:schemeClr val="tx1"/>
+          </a:fontRef>
+        </p:style>
+        <p:txBody>
+          <a:bodyPr rtlCol="0" anchor="ctr"/>
+          <a:lstStyle/>
+          <a:p>
+            <a:pPr algn="ctr"/>
+            <a:endParaRPr lang="en-US" dirty="0"/>
+          </a:p>
+        </p:txBody>
+      </p:sp>
+      <p:sp>
+        <p:nvSpPr>
+          <p:cNvPr id="3" name="Chỗ dành sẵn cho Nội dung 2">
+            <a:extLst>
+              <a:ext uri="{FF2B5EF4-FFF2-40B4-BE49-F238E27FC236}">
+                <a16:creationId xmlns:a16="http://schemas.microsoft.com/office/drawing/2014/main" id="{312D0949-38A3-46B9-BD4B-8B938AA3FB1A}"/>
+              </a:ext>
+            </a:extLst>
+          </p:cNvPr>
+          <p:cNvSpPr>
+            <a:spLocks noGrp="1"/>
+          </p:cNvSpPr>
+          <p:nvPr>
+            <p:ph idx="1"/>
+          </p:nvPr>
+        </p:nvSpPr>
+        <p:spPr>
+          <a:xfrm>
+            <a:off x="4310339" y="1477651"/>
+            <a:ext cx="8021680" cy="3902697"/>
+          </a:xfrm>
+        </p:spPr>
+        <p:txBody>
+          <a:bodyPr anchor="ctr">
+            <a:normAutofit/>
+          </a:bodyPr>
+          <a:lstStyle/>
+          <a:p>
+            <a:pPr marL="514350" indent="-514350">
+              <a:buAutoNum type="arabicPeriod"/>
+            </a:pPr>
+            <a:r>
+              <a:rPr lang="en-US" sz="2500" dirty="0">
+                <a:latin typeface="Times New Roman" panose="02020603050405020304" pitchFamily="18" charset="0"/>
+                <a:cs typeface="Times New Roman" panose="02020603050405020304" pitchFamily="18" charset="0"/>
+              </a:rPr>
+              <a:t>Constructor, Attribute, Method, Setter &amp; Getter</a:t>
+            </a:r>
+          </a:p>
+          <a:p>
+            <a:pPr marL="514350" indent="-514350">
+              <a:buAutoNum type="arabicPeriod"/>
+            </a:pPr>
+            <a:endParaRPr lang="en-US" sz="2500" dirty="0">
+              <a:latin typeface="Times New Roman" panose="02020603050405020304" pitchFamily="18" charset="0"/>
+              <a:cs typeface="Times New Roman" panose="02020603050405020304" pitchFamily="18" charset="0"/>
+            </a:endParaRPr>
+          </a:p>
+          <a:p>
+            <a:pPr marL="514350" indent="-514350">
+              <a:buAutoNum type="arabicPeriod"/>
+            </a:pPr>
+            <a:r>
+              <a:rPr lang="en-US" sz="2500" dirty="0">
+                <a:latin typeface="Times New Roman" panose="02020603050405020304" pitchFamily="18" charset="0"/>
+                <a:cs typeface="Times New Roman" panose="02020603050405020304" pitchFamily="18" charset="0"/>
+              </a:rPr>
+              <a:t>Inheritance (</a:t>
+            </a:r>
+            <a:r>
+              <a:rPr lang="en-US" sz="2500" dirty="0" err="1">
+                <a:latin typeface="Times New Roman" panose="02020603050405020304" pitchFamily="18" charset="0"/>
+                <a:cs typeface="Times New Roman" panose="02020603050405020304" pitchFamily="18" charset="0"/>
+              </a:rPr>
+              <a:t>tính</a:t>
+            </a:r>
+            <a:r>
+              <a:rPr lang="en-US" sz="2500" dirty="0">
+                <a:latin typeface="Times New Roman" panose="02020603050405020304" pitchFamily="18" charset="0"/>
+                <a:cs typeface="Times New Roman" panose="02020603050405020304" pitchFamily="18" charset="0"/>
+              </a:rPr>
+              <a:t> </a:t>
+            </a:r>
+            <a:r>
+              <a:rPr lang="en-US" sz="2500" dirty="0" err="1">
+                <a:latin typeface="Times New Roman" panose="02020603050405020304" pitchFamily="18" charset="0"/>
+                <a:cs typeface="Times New Roman" panose="02020603050405020304" pitchFamily="18" charset="0"/>
+              </a:rPr>
+              <a:t>kế</a:t>
+            </a:r>
+            <a:r>
+              <a:rPr lang="en-US" sz="2500" dirty="0">
+                <a:latin typeface="Times New Roman" panose="02020603050405020304" pitchFamily="18" charset="0"/>
+                <a:cs typeface="Times New Roman" panose="02020603050405020304" pitchFamily="18" charset="0"/>
+              </a:rPr>
+              <a:t> </a:t>
+            </a:r>
+            <a:r>
+              <a:rPr lang="en-US" sz="2500" dirty="0" err="1">
+                <a:latin typeface="Times New Roman" panose="02020603050405020304" pitchFamily="18" charset="0"/>
+                <a:cs typeface="Times New Roman" panose="02020603050405020304" pitchFamily="18" charset="0"/>
+              </a:rPr>
+              <a:t>thừa</a:t>
+            </a:r>
+            <a:r>
+              <a:rPr lang="en-US" sz="2500" dirty="0">
+                <a:latin typeface="Times New Roman" panose="02020603050405020304" pitchFamily="18" charset="0"/>
+                <a:cs typeface="Times New Roman" panose="02020603050405020304" pitchFamily="18" charset="0"/>
+              </a:rPr>
+              <a:t>), </a:t>
+            </a:r>
+            <a:r>
+              <a:rPr lang="en-US" sz="2500" dirty="0" err="1">
+                <a:latin typeface="Times New Roman" panose="02020603050405020304" pitchFamily="18" charset="0"/>
+                <a:cs typeface="Times New Roman" panose="02020603050405020304" pitchFamily="18" charset="0"/>
+              </a:rPr>
+              <a:t>kế</a:t>
+            </a:r>
+            <a:r>
+              <a:rPr lang="en-US" sz="2500" dirty="0">
+                <a:latin typeface="Times New Roman" panose="02020603050405020304" pitchFamily="18" charset="0"/>
+                <a:cs typeface="Times New Roman" panose="02020603050405020304" pitchFamily="18" charset="0"/>
+              </a:rPr>
+              <a:t> </a:t>
+            </a:r>
+            <a:r>
+              <a:rPr lang="en-US" sz="2500" dirty="0" err="1">
+                <a:latin typeface="Times New Roman" panose="02020603050405020304" pitchFamily="18" charset="0"/>
+                <a:cs typeface="Times New Roman" panose="02020603050405020304" pitchFamily="18" charset="0"/>
+              </a:rPr>
+              <a:t>thừa</a:t>
+            </a:r>
+            <a:r>
+              <a:rPr lang="en-US" sz="2500" dirty="0">
+                <a:latin typeface="Times New Roman" panose="02020603050405020304" pitchFamily="18" charset="0"/>
+                <a:cs typeface="Times New Roman" panose="02020603050405020304" pitchFamily="18" charset="0"/>
+              </a:rPr>
+              <a:t> </a:t>
+            </a:r>
+            <a:r>
+              <a:rPr lang="en-US" sz="2500" dirty="0" err="1">
+                <a:latin typeface="Times New Roman" panose="02020603050405020304" pitchFamily="18" charset="0"/>
+                <a:cs typeface="Times New Roman" panose="02020603050405020304" pitchFamily="18" charset="0"/>
+              </a:rPr>
+              <a:t>từ</a:t>
+            </a:r>
+            <a:r>
+              <a:rPr lang="en-US" sz="2500" dirty="0">
+                <a:latin typeface="Times New Roman" panose="02020603050405020304" pitchFamily="18" charset="0"/>
+                <a:cs typeface="Times New Roman" panose="02020603050405020304" pitchFamily="18" charset="0"/>
+              </a:rPr>
+              <a:t> Class &amp; Interface</a:t>
+            </a:r>
+          </a:p>
+          <a:p>
+            <a:pPr marL="514350" indent="-514350">
+              <a:buAutoNum type="arabicPeriod"/>
+            </a:pPr>
+            <a:endParaRPr lang="en-US" sz="2500" dirty="0">
+              <a:latin typeface="Times New Roman" panose="02020603050405020304" pitchFamily="18" charset="0"/>
+              <a:cs typeface="Times New Roman" panose="02020603050405020304" pitchFamily="18" charset="0"/>
+            </a:endParaRPr>
+          </a:p>
+          <a:p>
+            <a:pPr marL="514350" indent="-514350">
+              <a:buAutoNum type="arabicPeriod"/>
+            </a:pPr>
+            <a:r>
+              <a:rPr lang="en-US" sz="2500" dirty="0">
+                <a:latin typeface="Times New Roman" panose="02020603050405020304" pitchFamily="18" charset="0"/>
+                <a:cs typeface="Times New Roman" panose="02020603050405020304" pitchFamily="18" charset="0"/>
+              </a:rPr>
+              <a:t>Method override, Polymorphism (</a:t>
+            </a:r>
+            <a:r>
+              <a:rPr lang="en-US" sz="2500" dirty="0" err="1">
+                <a:latin typeface="Times New Roman" panose="02020603050405020304" pitchFamily="18" charset="0"/>
+                <a:cs typeface="Times New Roman" panose="02020603050405020304" pitchFamily="18" charset="0"/>
+              </a:rPr>
+              <a:t>tính</a:t>
+            </a:r>
+            <a:r>
+              <a:rPr lang="en-US" sz="2500" dirty="0">
+                <a:latin typeface="Times New Roman" panose="02020603050405020304" pitchFamily="18" charset="0"/>
+                <a:cs typeface="Times New Roman" panose="02020603050405020304" pitchFamily="18" charset="0"/>
+              </a:rPr>
+              <a:t> </a:t>
+            </a:r>
+            <a:r>
+              <a:rPr lang="en-US" sz="2500" dirty="0" err="1">
+                <a:latin typeface="Times New Roman" panose="02020603050405020304" pitchFamily="18" charset="0"/>
+                <a:cs typeface="Times New Roman" panose="02020603050405020304" pitchFamily="18" charset="0"/>
+              </a:rPr>
+              <a:t>đa</a:t>
+            </a:r>
+            <a:r>
+              <a:rPr lang="en-US" sz="2500" dirty="0">
+                <a:latin typeface="Times New Roman" panose="02020603050405020304" pitchFamily="18" charset="0"/>
+                <a:cs typeface="Times New Roman" panose="02020603050405020304" pitchFamily="18" charset="0"/>
+              </a:rPr>
+              <a:t> </a:t>
+            </a:r>
+            <a:r>
+              <a:rPr lang="en-US" sz="2500" dirty="0" err="1">
+                <a:latin typeface="Times New Roman" panose="02020603050405020304" pitchFamily="18" charset="0"/>
+                <a:cs typeface="Times New Roman" panose="02020603050405020304" pitchFamily="18" charset="0"/>
+              </a:rPr>
+              <a:t>hình</a:t>
+            </a:r>
+            <a:r>
+              <a:rPr lang="en-US" sz="2500" dirty="0">
+                <a:latin typeface="Times New Roman" panose="02020603050405020304" pitchFamily="18" charset="0"/>
+                <a:cs typeface="Times New Roman" panose="02020603050405020304" pitchFamily="18" charset="0"/>
+              </a:rPr>
+              <a:t>)</a:t>
+            </a:r>
+          </a:p>
+          <a:p>
+            <a:pPr marL="514350" indent="-514350">
+              <a:buAutoNum type="arabicPeriod"/>
+            </a:pPr>
+            <a:endParaRPr lang="en-US" sz="2500" dirty="0">
+              <a:latin typeface="Times New Roman" panose="02020603050405020304" pitchFamily="18" charset="0"/>
+              <a:cs typeface="Times New Roman" panose="02020603050405020304" pitchFamily="18" charset="0"/>
+            </a:endParaRPr>
+          </a:p>
+          <a:p>
+            <a:pPr marL="514350" indent="-514350">
+              <a:buAutoNum type="arabicPeriod"/>
+            </a:pPr>
+            <a:r>
+              <a:rPr lang="en-US" sz="2500" dirty="0" err="1">
+                <a:latin typeface="Times New Roman" panose="02020603050405020304" pitchFamily="18" charset="0"/>
+                <a:cs typeface="Times New Roman" panose="02020603050405020304" pitchFamily="18" charset="0"/>
+              </a:rPr>
+              <a:t>DataClass</a:t>
+            </a:r>
+            <a:r>
+              <a:rPr lang="en-US" sz="2500" dirty="0">
+                <a:latin typeface="Times New Roman" panose="02020603050405020304" pitchFamily="18" charset="0"/>
+                <a:cs typeface="Times New Roman" panose="02020603050405020304" pitchFamily="18" charset="0"/>
+              </a:rPr>
+              <a:t>, </a:t>
+            </a:r>
+            <a:r>
+              <a:rPr lang="en-US" sz="2500" dirty="0" err="1">
+                <a:latin typeface="Times New Roman" panose="02020603050405020304" pitchFamily="18" charset="0"/>
+                <a:cs typeface="Times New Roman" panose="02020603050405020304" pitchFamily="18" charset="0"/>
+              </a:rPr>
+              <a:t>NestedClass</a:t>
+            </a:r>
+            <a:r>
+              <a:rPr lang="en-US" sz="2500" dirty="0">
+                <a:latin typeface="Times New Roman" panose="02020603050405020304" pitchFamily="18" charset="0"/>
+                <a:cs typeface="Times New Roman" panose="02020603050405020304" pitchFamily="18" charset="0"/>
+              </a:rPr>
+              <a:t>, </a:t>
+            </a:r>
+            <a:r>
+              <a:rPr lang="en-US" sz="2500" dirty="0" err="1">
+                <a:latin typeface="Times New Roman" panose="02020603050405020304" pitchFamily="18" charset="0"/>
+                <a:cs typeface="Times New Roman" panose="02020603050405020304" pitchFamily="18" charset="0"/>
+              </a:rPr>
+              <a:t>EnumClass</a:t>
+            </a:r>
+            <a:r>
+              <a:rPr lang="en-US" sz="2500" dirty="0">
+                <a:latin typeface="Times New Roman" panose="02020603050405020304" pitchFamily="18" charset="0"/>
+                <a:cs typeface="Times New Roman" panose="02020603050405020304" pitchFamily="18" charset="0"/>
+              </a:rPr>
+              <a:t>, </a:t>
+            </a:r>
+            <a:r>
+              <a:rPr lang="en-US" sz="2500" dirty="0" err="1">
+                <a:latin typeface="Times New Roman" panose="02020603050405020304" pitchFamily="18" charset="0"/>
+                <a:cs typeface="Times New Roman" panose="02020603050405020304" pitchFamily="18" charset="0"/>
+              </a:rPr>
+              <a:t>InnerClass</a:t>
+            </a:r>
+            <a:endParaRPr lang="en-US" sz="2500" dirty="0">
+              <a:latin typeface="Times New Roman" panose="02020603050405020304" pitchFamily="18" charset="0"/>
+              <a:cs typeface="Times New Roman" panose="02020603050405020304" pitchFamily="18" charset="0"/>
+            </a:endParaRPr>
+          </a:p>
+        </p:txBody>
+      </p:sp>
+    </p:spTree>
+    <p:extLst>
+      <p:ext uri="{BB962C8B-B14F-4D97-AF65-F5344CB8AC3E}">
+        <p14:creationId xmlns:p14="http://schemas.microsoft.com/office/powerpoint/2010/main" val="765727076"/>
+      </p:ext>
+    </p:extLst>
+  </p:cSld>
+  <p:clrMapOvr>
+    <a:masterClrMapping/>
+  </p:clrMapOvr>
+</p:sld>
+</file>
+
+<file path=ppt/slides/slide12.xml><?xml version="1.0" encoding="utf-8"?>
+<p:sld xmlns:a="http://schemas.openxmlformats.org/drawingml/2006/main" xmlns:r="http://schemas.openxmlformats.org/officeDocument/2006/relationships" xmlns:p="http://schemas.openxmlformats.org/presentationml/2006/main">
+  <p:cSld>
+    <p:spTree>
+      <p:nvGrpSpPr>
+        <p:cNvPr id="1" name=""/>
+        <p:cNvGrpSpPr/>
+        <p:nvPr/>
+      </p:nvGrpSpPr>
+      <p:grpSpPr>
+        <a:xfrm>
+          <a:off x="0" y="0"/>
+          <a:ext cx="0" cy="0"/>
+          <a:chOff x="0" y="0"/>
+          <a:chExt cx="0" cy="0"/>
+        </a:xfrm>
+      </p:grpSpPr>
+    </p:spTree>
+    <p:extLst>
+      <p:ext uri="{BB962C8B-B14F-4D97-AF65-F5344CB8AC3E}">
+        <p14:creationId xmlns:p14="http://schemas.microsoft.com/office/powerpoint/2010/main" val="1360703974"/>
+      </p:ext>
+    </p:extLst>
+  </p:cSld>
+  <p:clrMapOvr>
+    <a:masterClrMapping/>
+  </p:clrMapOvr>
+</p:sld>
+</file>
+
+<file path=ppt/slides/slide13.xml><?xml version="1.0" encoding="utf-8"?>
+<p:sld xmlns:a="http://schemas.openxmlformats.org/drawingml/2006/main" xmlns:r="http://schemas.openxmlformats.org/officeDocument/2006/relationships" xmlns:p="http://schemas.openxmlformats.org/presentationml/2006/main">
+  <p:cSld>
+    <p:spTree>
+      <p:nvGrpSpPr>
+        <p:cNvPr id="1" name=""/>
+        <p:cNvGrpSpPr/>
+        <p:nvPr/>
+      </p:nvGrpSpPr>
+      <p:grpSpPr>
+        <a:xfrm>
+          <a:off x="0" y="0"/>
+          <a:ext cx="0" cy="0"/>
+          <a:chOff x="0" y="0"/>
+          <a:chExt cx="0" cy="0"/>
+        </a:xfrm>
+      </p:grpSpPr>
+      <p:sp>
+        <p:nvSpPr>
+          <p:cNvPr id="2" name="Tiêu đề 1">
+            <a:extLst>
+              <a:ext uri="{FF2B5EF4-FFF2-40B4-BE49-F238E27FC236}">
+                <a16:creationId xmlns:a16="http://schemas.microsoft.com/office/drawing/2014/main" id="{625035AC-22C9-461A-90F6-08D26D07EE3E}"/>
+              </a:ext>
+            </a:extLst>
+          </p:cNvPr>
+          <p:cNvSpPr>
+            <a:spLocks noGrp="1"/>
+          </p:cNvSpPr>
+          <p:nvPr>
+            <p:ph type="title"/>
+          </p:nvPr>
+        </p:nvSpPr>
+        <p:spPr/>
+        <p:txBody>
+          <a:bodyPr/>
+          <a:lstStyle/>
+          <a:p>
+            <a:endParaRPr lang="en-US"/>
+          </a:p>
+        </p:txBody>
+      </p:sp>
+      <p:sp>
+        <p:nvSpPr>
+          <p:cNvPr id="3" name="Chỗ dành sẵn cho Nội dung 2">
+            <a:extLst>
+              <a:ext uri="{FF2B5EF4-FFF2-40B4-BE49-F238E27FC236}">
+                <a16:creationId xmlns:a16="http://schemas.microsoft.com/office/drawing/2014/main" id="{419684B4-3BD7-4F07-8658-E332DB17F1CC}"/>
+              </a:ext>
+            </a:extLst>
+          </p:cNvPr>
+          <p:cNvSpPr>
+            <a:spLocks noGrp="1"/>
+          </p:cNvSpPr>
+          <p:nvPr>
+            <p:ph idx="1"/>
+          </p:nvPr>
+        </p:nvSpPr>
+        <p:spPr/>
+        <p:txBody>
+          <a:bodyPr/>
+          <a:lstStyle/>
+          <a:p>
+            <a:endParaRPr lang="en-US"/>
+          </a:p>
+        </p:txBody>
+      </p:sp>
+    </p:spTree>
+    <p:extLst>
+      <p:ext uri="{BB962C8B-B14F-4D97-AF65-F5344CB8AC3E}">
+        <p14:creationId xmlns:p14="http://schemas.microsoft.com/office/powerpoint/2010/main" val="892614454"/>
+      </p:ext>
+    </p:extLst>
+  </p:cSld>
+  <p:clrMapOvr>
+    <a:masterClrMapping/>
+  </p:clrMapOvr>
+</p:sld>
+</file>
+
+<file path=ppt/slides/slide14.xml><?xml version="1.0" encoding="utf-8"?>
+<p:sld xmlns:a="http://schemas.openxmlformats.org/drawingml/2006/main" xmlns:r="http://schemas.openxmlformats.org/officeDocument/2006/relationships" xmlns:p="http://schemas.openxmlformats.org/presentationml/2006/main">
+  <p:cSld>
+    <p:spTree>
+      <p:nvGrpSpPr>
+        <p:cNvPr id="1" name=""/>
+        <p:cNvGrpSpPr/>
+        <p:nvPr/>
+      </p:nvGrpSpPr>
+      <p:grpSpPr>
+        <a:xfrm>
+          <a:off x="0" y="0"/>
+          <a:ext cx="0" cy="0"/>
+          <a:chOff x="0" y="0"/>
+          <a:chExt cx="0" cy="0"/>
+        </a:xfrm>
+      </p:grpSpPr>
+      <p:sp>
+        <p:nvSpPr>
+          <p:cNvPr id="2" name="Tiêu đề 1">
+            <a:extLst>
+              <a:ext uri="{FF2B5EF4-FFF2-40B4-BE49-F238E27FC236}">
+                <a16:creationId xmlns:a16="http://schemas.microsoft.com/office/drawing/2014/main" id="{F2E5E1C9-EE30-4415-B73A-A1D5F0631C0E}"/>
+              </a:ext>
+            </a:extLst>
+          </p:cNvPr>
+          <p:cNvSpPr>
+            <a:spLocks noGrp="1"/>
+          </p:cNvSpPr>
+          <p:nvPr>
+            <p:ph type="title"/>
+          </p:nvPr>
+        </p:nvSpPr>
+        <p:spPr/>
+        <p:txBody>
+          <a:bodyPr/>
+          <a:lstStyle/>
+          <a:p>
+            <a:endParaRPr lang="en-US"/>
+          </a:p>
+        </p:txBody>
+      </p:sp>
+      <p:sp>
+        <p:nvSpPr>
+          <p:cNvPr id="3" name="Chỗ dành sẵn cho Nội dung 2">
+            <a:extLst>
+              <a:ext uri="{FF2B5EF4-FFF2-40B4-BE49-F238E27FC236}">
+                <a16:creationId xmlns:a16="http://schemas.microsoft.com/office/drawing/2014/main" id="{2637A1FE-825B-4500-8D15-701AB93369BF}"/>
+              </a:ext>
+            </a:extLst>
+          </p:cNvPr>
+          <p:cNvSpPr>
+            <a:spLocks noGrp="1"/>
+          </p:cNvSpPr>
+          <p:nvPr>
+            <p:ph idx="1"/>
+          </p:nvPr>
+        </p:nvSpPr>
+        <p:spPr/>
+        <p:txBody>
+          <a:bodyPr/>
+          <a:lstStyle/>
+          <a:p>
+            <a:endParaRPr lang="en-US"/>
+          </a:p>
+        </p:txBody>
+      </p:sp>
+    </p:spTree>
+    <p:extLst>
+      <p:ext uri="{BB962C8B-B14F-4D97-AF65-F5344CB8AC3E}">
+        <p14:creationId xmlns:p14="http://schemas.microsoft.com/office/powerpoint/2010/main" val="2491150950"/>
       </p:ext>
     </p:extLst>
   </p:cSld>

</xml_diff>